<commit_message>
Fix Raspberry Pi OS name: Raspbian -> Raspberry Pi OS
</commit_message>
<xml_diff>
--- a/presentation/Linux.pptx
+++ b/presentation/Linux.pptx
@@ -273,7 +273,7 @@
                   <a:schemeClr val="tx2"/>
                 </a:solidFill>
               </a:rPr>
-              <a:t>18.02.2020</a:t>
+              <a:t>10.02.2021</a:t>
             </a:fld>
             <a:endParaRPr lang="de-DE">
               <a:solidFill>
@@ -623,7 +623,7 @@
             <a:fld id="{B4113CCE-1A1A-46DB-884A-AE560F65C3AF}" type="datetimeFigureOut">
               <a:rPr lang="de-DE" smtClean="0"/>
               <a:pPr/>
-              <a:t>18.02.2020</a:t>
+              <a:t>10.02.2021</a:t>
             </a:fld>
             <a:endParaRPr lang="de-DE"/>
           </a:p>
@@ -5698,7 +5698,7 @@
           <a:p>
             <a:fld id="{CFEA6AA4-0991-42E1-BC63-6F4AD90EC29E}" type="datetime1">
               <a:rPr lang="de-DE" smtClean="0"/>
-              <a:t>18.02.2020</a:t>
+              <a:t>10.02.2021</a:t>
             </a:fld>
             <a:endParaRPr lang="de-DE"/>
           </a:p>
@@ -5822,7 +5822,7 @@
           <a:p>
             <a:fld id="{24FEE064-20B6-4FDD-ABE2-6F47996CEAD6}" type="datetime1">
               <a:rPr lang="de-DE" smtClean="0"/>
-              <a:t>18.02.2020</a:t>
+              <a:t>10.02.2021</a:t>
             </a:fld>
             <a:endParaRPr lang="de-DE"/>
           </a:p>
@@ -6017,7 +6017,7 @@
           <a:p>
             <a:fld id="{240E1E18-93F5-4B2E-AEF7-8E48263EBED4}" type="datetime1">
               <a:rPr lang="de-DE" smtClean="0"/>
-              <a:t>18.02.2020</a:t>
+              <a:t>10.02.2021</a:t>
             </a:fld>
             <a:endParaRPr lang="de-DE"/>
           </a:p>
@@ -6249,7 +6249,7 @@
           <a:p>
             <a:fld id="{4B4D8602-DAD7-4E23-BFB9-3455C7D4313C}" type="datetime1">
               <a:rPr lang="de-DE" smtClean="0"/>
-              <a:t>18.02.2020</a:t>
+              <a:t>10.02.2021</a:t>
             </a:fld>
             <a:endParaRPr lang="de-DE"/>
           </a:p>
@@ -6369,7 +6369,7 @@
           <a:p>
             <a:fld id="{E20B9D4E-815C-4111-ABBF-DEE1CACAE6AA}" type="datetime1">
               <a:rPr lang="de-DE" smtClean="0"/>
-              <a:t>18.02.2020</a:t>
+              <a:t>10.02.2021</a:t>
             </a:fld>
             <a:endParaRPr lang="de-DE"/>
           </a:p>
@@ -6467,7 +6467,7 @@
           <a:p>
             <a:fld id="{0126B79D-B5EC-4285-97EC-EF7496402533}" type="datetime1">
               <a:rPr lang="de-DE" smtClean="0"/>
-              <a:t>18.02.2020</a:t>
+              <a:t>10.02.2021</a:t>
             </a:fld>
             <a:endParaRPr lang="de-DE"/>
           </a:p>
@@ -6591,7 +6591,7 @@
           <a:p>
             <a:fld id="{A64A84C6-4CEF-4075-AEBF-0B18FE64A257}" type="datetime1">
               <a:rPr lang="de-DE" smtClean="0"/>
-              <a:t>18.02.2020</a:t>
+              <a:t>10.02.2021</a:t>
             </a:fld>
             <a:endParaRPr lang="de-DE"/>
           </a:p>
@@ -6739,7 +6739,7 @@
           <a:p>
             <a:fld id="{2285572B-36BB-4553-90AA-CD595DED4796}" type="datetime1">
               <a:rPr lang="de-DE" smtClean="0"/>
-              <a:t>18.02.2020</a:t>
+              <a:t>10.02.2021</a:t>
             </a:fld>
             <a:endParaRPr lang="de-DE"/>
           </a:p>
@@ -6938,7 +6938,7 @@
           <a:p>
             <a:fld id="{A722451B-EEB8-4260-8735-BD35732E0A47}" type="datetime1">
               <a:rPr lang="de-DE" smtClean="0"/>
-              <a:t>18.02.2020</a:t>
+              <a:t>10.02.2021</a:t>
             </a:fld>
             <a:endParaRPr lang="de-DE"/>
           </a:p>
@@ -7137,7 +7137,7 @@
           <a:p>
             <a:fld id="{2D00F25A-6DE8-43FF-8796-5342096261B6}" type="datetime1">
               <a:rPr lang="de-DE" smtClean="0"/>
-              <a:t>18.02.2020</a:t>
+              <a:t>10.02.2021</a:t>
             </a:fld>
             <a:endParaRPr lang="de-DE"/>
           </a:p>
@@ -7552,7 +7552,7 @@
           <a:p>
             <a:fld id="{882F305B-FDA3-4472-8230-F3BD13619FC2}" type="datetime1">
               <a:rPr lang="de-DE" smtClean="0"/>
-              <a:t>18.02.2020</a:t>
+              <a:t>10.02.2021</a:t>
             </a:fld>
             <a:endParaRPr lang="de-DE" dirty="0"/>
           </a:p>
@@ -8127,7 +8127,7 @@
           <a:p>
             <a:fld id="{5C544C3A-D5CB-4D44-A6E2-71AF6B3FA83D}" type="datetime1">
               <a:rPr lang="de-DE" smtClean="0"/>
-              <a:t>18.02.2020</a:t>
+              <a:t>10.02.2021</a:t>
             </a:fld>
             <a:endParaRPr lang="de-DE" dirty="0"/>
           </a:p>
@@ -8761,7 +8761,7 @@
           <a:p>
             <a:fld id="{95971638-D81B-47C4-89CA-CC80CE3CA94E}" type="datetime1">
               <a:rPr lang="de-DE" smtClean="0"/>
-              <a:t>18.02.2020</a:t>
+              <a:t>10.02.2021</a:t>
             </a:fld>
             <a:endParaRPr lang="de-DE"/>
           </a:p>
@@ -8930,7 +8930,7 @@
           <a:p>
             <a:fld id="{4B4D8602-DAD7-4E23-BFB9-3455C7D4313C}" type="datetime1">
               <a:rPr lang="de-DE" smtClean="0"/>
-              <a:t>18.02.2020</a:t>
+              <a:t>10.02.2021</a:t>
             </a:fld>
             <a:endParaRPr lang="de-DE"/>
           </a:p>
@@ -9238,7 +9238,7 @@
           <a:p>
             <a:fld id="{4B4D8602-DAD7-4E23-BFB9-3455C7D4313C}" type="datetime1">
               <a:rPr lang="de-DE" smtClean="0"/>
-              <a:t>18.02.2020</a:t>
+              <a:t>10.02.2021</a:t>
             </a:fld>
             <a:endParaRPr lang="de-DE"/>
           </a:p>
@@ -9595,7 +9595,7 @@
           <a:p>
             <a:fld id="{4B4D8602-DAD7-4E23-BFB9-3455C7D4313C}" type="datetime1">
               <a:rPr lang="de-DE" smtClean="0"/>
-              <a:t>18.02.2020</a:t>
+              <a:t>10.02.2021</a:t>
             </a:fld>
             <a:endParaRPr lang="de-DE"/>
           </a:p>
@@ -9831,7 +9831,7 @@
           <a:p>
             <a:fld id="{4B4D8602-DAD7-4E23-BFB9-3455C7D4313C}" type="datetime1">
               <a:rPr lang="de-DE" smtClean="0"/>
-              <a:t>18.02.2020</a:t>
+              <a:t>10.02.2021</a:t>
             </a:fld>
             <a:endParaRPr lang="de-DE"/>
           </a:p>
@@ -10067,7 +10067,7 @@
           <a:p>
             <a:fld id="{4B4D8602-DAD7-4E23-BFB9-3455C7D4313C}" type="datetime1">
               <a:rPr lang="de-DE" smtClean="0"/>
-              <a:t>18.02.2020</a:t>
+              <a:t>10.02.2021</a:t>
             </a:fld>
             <a:endParaRPr lang="de-DE"/>
           </a:p>
@@ -10303,7 +10303,7 @@
           <a:p>
             <a:fld id="{4B4D8602-DAD7-4E23-BFB9-3455C7D4313C}" type="datetime1">
               <a:rPr lang="de-DE" smtClean="0"/>
-              <a:t>18.02.2020</a:t>
+              <a:t>10.02.2021</a:t>
             </a:fld>
             <a:endParaRPr lang="de-DE"/>
           </a:p>
@@ -10539,7 +10539,7 @@
           <a:p>
             <a:fld id="{4B4D8602-DAD7-4E23-BFB9-3455C7D4313C}" type="datetime1">
               <a:rPr lang="de-DE" smtClean="0"/>
-              <a:t>18.02.2020</a:t>
+              <a:t>10.02.2021</a:t>
             </a:fld>
             <a:endParaRPr lang="de-DE"/>
           </a:p>
@@ -10775,7 +10775,7 @@
           <a:p>
             <a:fld id="{4B4D8602-DAD7-4E23-BFB9-3455C7D4313C}" type="datetime1">
               <a:rPr lang="de-DE" smtClean="0"/>
-              <a:t>18.02.2020</a:t>
+              <a:t>10.02.2021</a:t>
             </a:fld>
             <a:endParaRPr lang="de-DE"/>
           </a:p>
@@ -11164,7 +11164,7 @@
           <a:p>
             <a:fld id="{4B4D8602-DAD7-4E23-BFB9-3455C7D4313C}" type="datetime1">
               <a:rPr lang="de-DE" smtClean="0"/>
-              <a:t>18.02.2020</a:t>
+              <a:t>10.02.2021</a:t>
             </a:fld>
             <a:endParaRPr lang="de-DE"/>
           </a:p>
@@ -11436,7 +11436,7 @@
           <a:p>
             <a:fld id="{1A5EA4EC-F8D0-4358-A248-2054A6A25072}" type="datetime1">
               <a:rPr lang="de-DE" smtClean="0"/>
-              <a:t>18.02.2020</a:t>
+              <a:t>10.02.2021</a:t>
             </a:fld>
             <a:endParaRPr lang="de-DE"/>
           </a:p>
@@ -11608,7 +11608,7 @@
           <a:p>
             <a:fld id="{1E1724F2-4207-4DD1-AE31-489D49A6C7DE}" type="datetime1">
               <a:rPr lang="de-DE" smtClean="0"/>
-              <a:t>18.02.2020</a:t>
+              <a:t>10.02.2021</a:t>
             </a:fld>
             <a:endParaRPr lang="de-DE"/>
           </a:p>
@@ -11811,7 +11811,7 @@
           <a:p>
             <a:fld id="{1A5EA4EC-F8D0-4358-A248-2054A6A25072}" type="datetime1">
               <a:rPr lang="de-DE" smtClean="0"/>
-              <a:t>18.02.2020</a:t>
+              <a:t>10.02.2021</a:t>
             </a:fld>
             <a:endParaRPr lang="de-DE"/>
           </a:p>
@@ -11955,7 +11955,7 @@
           <a:p>
             <a:fld id="{B315B82D-E9CA-47F1-9EAF-27BD449E20A8}" type="datetime1">
               <a:rPr lang="de-DE" smtClean="0"/>
-              <a:t>18.02.2020</a:t>
+              <a:t>10.02.2021</a:t>
             </a:fld>
             <a:endParaRPr lang="de-DE"/>
           </a:p>
@@ -12171,18 +12171,9 @@
           <a:p>
             <a:pPr lvl="1"/>
             <a:r>
-              <a:rPr lang="de-DE" dirty="0" err="1"/>
-              <a:t>Raspberry</a:t>
-            </a:r>
-            <a:r>
               <a:rPr lang="de-DE" dirty="0"/>
-              <a:t>: </a:t>
-            </a:r>
-            <a:r>
-              <a:rPr lang="de-DE" dirty="0" err="1"/>
-              <a:t>Raspbian</a:t>
-            </a:r>
-            <a:endParaRPr lang="de-DE" dirty="0"/>
+              <a:t>Raspberry: Raspberry Pi OS</a:t>
+            </a:r>
           </a:p>
         </p:txBody>
       </p:sp>
@@ -12203,7 +12194,7 @@
           <a:p>
             <a:fld id="{382A8303-5F2E-4856-A721-416BD35A2F60}" type="datetime1">
               <a:rPr lang="de-DE" smtClean="0"/>
-              <a:t>18.02.2020</a:t>
+              <a:t>10.02.2021</a:t>
             </a:fld>
             <a:endParaRPr lang="de-DE"/>
           </a:p>
@@ -12426,7 +12417,7 @@
         </p:blipFill>
         <p:spPr>
           <a:xfrm>
-            <a:off x="5233651" y="5075228"/>
+            <a:off x="5624067" y="5075228"/>
             <a:ext cx="1460875" cy="1233377"/>
           </a:xfrm>
           <a:prstGeom prst="rect">
@@ -12566,7 +12557,7 @@
           <a:p>
             <a:fld id="{4B4D8602-DAD7-4E23-BFB9-3455C7D4313C}" type="datetime1">
               <a:rPr lang="de-DE" smtClean="0"/>
-              <a:t>18.02.2020</a:t>
+              <a:t>10.02.2021</a:t>
             </a:fld>
             <a:endParaRPr lang="de-DE"/>
           </a:p>
@@ -12815,7 +12806,7 @@
           <a:p>
             <a:fld id="{4B4D8602-DAD7-4E23-BFB9-3455C7D4313C}" type="datetime1">
               <a:rPr lang="de-DE" smtClean="0"/>
-              <a:t>18.02.2020</a:t>
+              <a:t>10.02.2021</a:t>
             </a:fld>
             <a:endParaRPr lang="de-DE"/>
           </a:p>
@@ -13024,7 +13015,7 @@
           <a:p>
             <a:fld id="{4B4D8602-DAD7-4E23-BFB9-3455C7D4313C}" type="datetime1">
               <a:rPr lang="de-DE" smtClean="0"/>
-              <a:t>18.02.2020</a:t>
+              <a:t>10.02.2021</a:t>
             </a:fld>
             <a:endParaRPr lang="de-DE"/>
           </a:p>
@@ -13217,7 +13208,7 @@
           <a:p>
             <a:fld id="{4B4D8602-DAD7-4E23-BFB9-3455C7D4313C}" type="datetime1">
               <a:rPr lang="de-DE" smtClean="0"/>
-              <a:t>18.02.2020</a:t>
+              <a:t>10.02.2021</a:t>
             </a:fld>
             <a:endParaRPr lang="de-DE"/>
           </a:p>
@@ -13448,7 +13439,7 @@
           <a:p>
             <a:fld id="{4B4D8602-DAD7-4E23-BFB9-3455C7D4313C}" type="datetime1">
               <a:rPr lang="de-DE" smtClean="0"/>
-              <a:t>18.02.2020</a:t>
+              <a:t>10.02.2021</a:t>
             </a:fld>
             <a:endParaRPr lang="de-DE"/>
           </a:p>
@@ -13631,7 +13622,7 @@
           <a:p>
             <a:fld id="{4B4D8602-DAD7-4E23-BFB9-3455C7D4313C}" type="datetime1">
               <a:rPr lang="de-DE" smtClean="0"/>
-              <a:t>18.02.2020</a:t>
+              <a:t>10.02.2021</a:t>
             </a:fld>
             <a:endParaRPr lang="de-DE"/>
           </a:p>

</xml_diff>